<commit_message>
adding first round of disk data
</commit_message>
<xml_diff>
--- a/Lab Meeting 5_25_17.pptx
+++ b/Lab Meeting 5_25_17.pptx
@@ -205,7 +205,7 @@
                   <c:v>131332.6229166667</c:v>
                 </c:pt>
                 <c:pt idx="6">
-                  <c:v>65666.31145833335</c:v>
+                  <c:v>65666.31145833336</c:v>
                 </c:pt>
                 <c:pt idx="7">
                   <c:v>32833.15572916667</c:v>
@@ -298,11 +298,11 @@
           <c:showPercent val="0"/>
           <c:showBubbleSize val="0"/>
         </c:dLbls>
-        <c:axId val="-987125424"/>
-        <c:axId val="-953065744"/>
+        <c:axId val="-937892144"/>
+        <c:axId val="-937888752"/>
       </c:scatterChart>
       <c:valAx>
-        <c:axId val="-987125424"/>
+        <c:axId val="-937892144"/>
         <c:scaling>
           <c:logBase val="10.0"/>
           <c:orientation val="minMax"/>
@@ -410,12 +410,12 @@
             <a:endParaRPr lang="en-US"/>
           </a:p>
         </c:txPr>
-        <c:crossAx val="-953065744"/>
+        <c:crossAx val="-937888752"/>
         <c:crosses val="autoZero"/>
         <c:crossBetween val="midCat"/>
       </c:valAx>
       <c:valAx>
-        <c:axId val="-953065744"/>
+        <c:axId val="-937888752"/>
         <c:scaling>
           <c:orientation val="minMax"/>
         </c:scaling>
@@ -522,7 +522,7 @@
             <a:endParaRPr lang="en-US"/>
           </a:p>
         </c:txPr>
-        <c:crossAx val="-987125424"/>
+        <c:crossAx val="-937892144"/>
         <c:crosses val="autoZero"/>
         <c:crossBetween val="midCat"/>
       </c:valAx>
@@ -924,11 +924,11 @@
         </c:dLbls>
         <c:gapWidth val="219"/>
         <c:overlap val="-27"/>
-        <c:axId val="-1082256976"/>
-        <c:axId val="-1082252944"/>
+        <c:axId val="-1082305216"/>
+        <c:axId val="-1082805232"/>
       </c:barChart>
       <c:catAx>
-        <c:axId val="-1082256976"/>
+        <c:axId val="-1082305216"/>
         <c:scaling>
           <c:orientation val="minMax"/>
         </c:scaling>
@@ -1027,7 +1027,7 @@
             <a:endParaRPr lang="en-US"/>
           </a:p>
         </c:txPr>
-        <c:crossAx val="-1082252944"/>
+        <c:crossAx val="-1082805232"/>
         <c:crosses val="autoZero"/>
         <c:auto val="1"/>
         <c:lblAlgn val="ctr"/>
@@ -1035,7 +1035,7 @@
         <c:noMultiLvlLbl val="0"/>
       </c:catAx>
       <c:valAx>
-        <c:axId val="-1082252944"/>
+        <c:axId val="-1082805232"/>
         <c:scaling>
           <c:orientation val="minMax"/>
           <c:max val="150.0"/>
@@ -1138,7 +1138,7 @@
             <a:endParaRPr lang="en-US"/>
           </a:p>
         </c:txPr>
-        <c:crossAx val="-1082256976"/>
+        <c:crossAx val="-1082305216"/>
         <c:crosses val="autoZero"/>
         <c:crossBetween val="between"/>
       </c:valAx>
@@ -1597,7 +1597,7 @@
                   <c:v>1.987462</c:v>
                 </c:pt>
                 <c:pt idx="47">
-                  <c:v>2.312298999999999</c:v>
+                  <c:v>2.312298999999998</c:v>
                 </c:pt>
                 <c:pt idx="48">
                   <c:v>2.554004</c:v>
@@ -1619,11 +1619,11 @@
         </c:dLbls>
         <c:gapWidth val="219"/>
         <c:overlap val="-27"/>
-        <c:axId val="-1085387504"/>
-        <c:axId val="-1085383472"/>
+        <c:axId val="-1085835456"/>
+        <c:axId val="-938003184"/>
       </c:barChart>
       <c:catAx>
-        <c:axId val="-1085387504"/>
+        <c:axId val="-1085835456"/>
         <c:scaling>
           <c:orientation val="minMax"/>
         </c:scaling>
@@ -1722,7 +1722,7 @@
             <a:endParaRPr lang="en-US"/>
           </a:p>
         </c:txPr>
-        <c:crossAx val="-1085383472"/>
+        <c:crossAx val="-938003184"/>
         <c:crosses val="autoZero"/>
         <c:auto val="1"/>
         <c:lblAlgn val="ctr"/>
@@ -1730,7 +1730,7 @@
         <c:noMultiLvlLbl val="0"/>
       </c:catAx>
       <c:valAx>
-        <c:axId val="-1085383472"/>
+        <c:axId val="-938003184"/>
         <c:scaling>
           <c:orientation val="minMax"/>
         </c:scaling>
@@ -1831,7 +1831,7 @@
             <a:endParaRPr lang="en-US"/>
           </a:p>
         </c:txPr>
-        <c:crossAx val="-1085387504"/>
+        <c:crossAx val="-1085835456"/>
         <c:crosses val="autoZero"/>
         <c:crossBetween val="between"/>
       </c:valAx>
@@ -2146,13 +2146,13 @@
                   <c:v>9278.571242613632</c:v>
                 </c:pt>
                 <c:pt idx="2">
-                  <c:v>5867.316224858238</c:v>
+                  <c:v>5867.31622485824</c:v>
                 </c:pt>
                 <c:pt idx="3">
                   <c:v>8030.383015548729</c:v>
                 </c:pt>
                 <c:pt idx="4">
-                  <c:v>8096.28984293092</c:v>
+                  <c:v>8096.289842930919</c:v>
                 </c:pt>
                 <c:pt idx="5">
                   <c:v>4798.896853514524</c:v>
@@ -2215,7 +2215,7 @@
                   <c:v>11980.62000238286</c:v>
                 </c:pt>
                 <c:pt idx="25">
-                  <c:v>8733.70538164569</c:v>
+                  <c:v>8733.705381645688</c:v>
                 </c:pt>
                 <c:pt idx="26">
                   <c:v>10870.0854580083</c:v>
@@ -2257,7 +2257,7 @@
                   <c:v>14606.51611118474</c:v>
                 </c:pt>
                 <c:pt idx="39">
-                  <c:v>8119.151622095067</c:v>
+                  <c:v>8119.151622095068</c:v>
                 </c:pt>
                 <c:pt idx="40">
                   <c:v>13644.02056570355</c:v>
@@ -2303,11 +2303,11 @@
         </c:dLbls>
         <c:gapWidth val="219"/>
         <c:overlap val="-27"/>
-        <c:axId val="-950009024"/>
-        <c:axId val="-950005264"/>
+        <c:axId val="-952057936"/>
+        <c:axId val="-1082361296"/>
       </c:barChart>
       <c:catAx>
-        <c:axId val="-950009024"/>
+        <c:axId val="-952057936"/>
         <c:scaling>
           <c:orientation val="minMax"/>
         </c:scaling>
@@ -2406,7 +2406,7 @@
             <a:endParaRPr lang="en-US"/>
           </a:p>
         </c:txPr>
-        <c:crossAx val="-950005264"/>
+        <c:crossAx val="-1082361296"/>
         <c:crosses val="autoZero"/>
         <c:auto val="1"/>
         <c:lblAlgn val="ctr"/>
@@ -2414,7 +2414,7 @@
         <c:noMultiLvlLbl val="0"/>
       </c:catAx>
       <c:valAx>
-        <c:axId val="-950005264"/>
+        <c:axId val="-1082361296"/>
         <c:scaling>
           <c:orientation val="minMax"/>
         </c:scaling>
@@ -2515,7 +2515,7 @@
             <a:endParaRPr lang="en-US"/>
           </a:p>
         </c:txPr>
-        <c:crossAx val="-950009024"/>
+        <c:crossAx val="-952057936"/>
         <c:crosses val="autoZero"/>
         <c:crossBetween val="between"/>
       </c:valAx>
@@ -2835,7 +2835,7 @@
                   <c:v>24.19788084768496</c:v>
                 </c:pt>
                 <c:pt idx="4">
-                  <c:v>23.41869663912455</c:v>
+                  <c:v>23.41869663912454</c:v>
                 </c:pt>
                 <c:pt idx="5">
                   <c:v>13.44579323903876</c:v>
@@ -2862,16 +2862,16 @@
                   <c:v>34.23854512975448</c:v>
                 </c:pt>
                 <c:pt idx="13">
-                  <c:v>36.35738625398321</c:v>
+                  <c:v>36.35738625398319</c:v>
                 </c:pt>
                 <c:pt idx="14">
-                  <c:v>24.24218180516433</c:v>
+                  <c:v>24.24218180516432</c:v>
                 </c:pt>
                 <c:pt idx="15">
                   <c:v>30.88702634398927</c:v>
                 </c:pt>
                 <c:pt idx="16">
-                  <c:v>9.506065115639295</c:v>
+                  <c:v>9.506065115639296</c:v>
                 </c:pt>
                 <c:pt idx="17">
                   <c:v>31.59203717418092</c:v>
@@ -2952,7 +2952,7 @@
                   <c:v>39.7814178403306</c:v>
                 </c:pt>
                 <c:pt idx="43">
-                  <c:v>24.87203978114324</c:v>
+                  <c:v>24.87203978114323</c:v>
                 </c:pt>
                 <c:pt idx="44">
                   <c:v>26.22405042158617</c:v>
@@ -2964,10 +2964,10 @@
                   <c:v>23.8801565859167</c:v>
                 </c:pt>
                 <c:pt idx="47">
-                  <c:v>18.44405650616583</c:v>
+                  <c:v>18.44405650616582</c:v>
                 </c:pt>
                 <c:pt idx="48">
-                  <c:v>23.56433058216927</c:v>
+                  <c:v>23.56433058216926</c:v>
                 </c:pt>
                 <c:pt idx="49">
                   <c:v>6.28555829834931</c:v>
@@ -2986,11 +2986,11 @@
         </c:dLbls>
         <c:gapWidth val="219"/>
         <c:overlap val="-27"/>
-        <c:axId val="-952934496"/>
-        <c:axId val="-952930464"/>
+        <c:axId val="-937151088"/>
+        <c:axId val="-937142208"/>
       </c:barChart>
       <c:catAx>
-        <c:axId val="-952934496"/>
+        <c:axId val="-937151088"/>
         <c:scaling>
           <c:orientation val="minMax"/>
         </c:scaling>
@@ -3089,7 +3089,7 @@
             <a:endParaRPr lang="en-US"/>
           </a:p>
         </c:txPr>
-        <c:crossAx val="-952930464"/>
+        <c:crossAx val="-937142208"/>
         <c:crosses val="autoZero"/>
         <c:auto val="1"/>
         <c:lblAlgn val="ctr"/>
@@ -3097,7 +3097,7 @@
         <c:noMultiLvlLbl val="0"/>
       </c:catAx>
       <c:valAx>
-        <c:axId val="-952930464"/>
+        <c:axId val="-937142208"/>
         <c:scaling>
           <c:orientation val="minMax"/>
         </c:scaling>
@@ -3198,7 +3198,7 @@
             <a:endParaRPr lang="en-US"/>
           </a:p>
         </c:txPr>
-        <c:crossAx val="-952934496"/>
+        <c:crossAx val="-937151088"/>
         <c:crosses val="autoZero"/>
         <c:crossBetween val="between"/>
       </c:valAx>
@@ -3868,11 +3868,11 @@
         </c:dLbls>
         <c:gapWidth val="150"/>
         <c:overlap val="100"/>
-        <c:axId val="-934050048"/>
-        <c:axId val="-932497424"/>
+        <c:axId val="-986870928"/>
+        <c:axId val="-986862896"/>
       </c:barChart>
       <c:catAx>
-        <c:axId val="-934050048"/>
+        <c:axId val="-986870928"/>
         <c:scaling>
           <c:orientation val="minMax"/>
         </c:scaling>
@@ -3973,7 +3973,7 @@
             <a:endParaRPr lang="en-US"/>
           </a:p>
         </c:txPr>
-        <c:crossAx val="-932497424"/>
+        <c:crossAx val="-986862896"/>
         <c:crosses val="autoZero"/>
         <c:auto val="1"/>
         <c:lblAlgn val="ctr"/>
@@ -3981,7 +3981,7 @@
         <c:noMultiLvlLbl val="0"/>
       </c:catAx>
       <c:valAx>
-        <c:axId val="-932497424"/>
+        <c:axId val="-986862896"/>
         <c:scaling>
           <c:orientation val="minMax"/>
         </c:scaling>
@@ -4083,7 +4083,7 @@
             <a:endParaRPr lang="en-US"/>
           </a:p>
         </c:txPr>
-        <c:crossAx val="-934050048"/>
+        <c:crossAx val="-986870928"/>
         <c:crosses val="autoZero"/>
         <c:crossBetween val="between"/>
       </c:valAx>
@@ -4467,25 +4467,25 @@
                   <c:v>3.975694036851656</c:v>
                 </c:pt>
                 <c:pt idx="4">
-                  <c:v>4.812777714368902</c:v>
+                  <c:v>4.812777714368901</c:v>
                 </c:pt>
                 <c:pt idx="5">
                   <c:v>5.630809378819538</c:v>
                 </c:pt>
                 <c:pt idx="6">
-                  <c:v>6.477851181393653</c:v>
+                  <c:v>6.477851181393654</c:v>
                 </c:pt>
                 <c:pt idx="7">
-                  <c:v>7.310571812069241</c:v>
+                  <c:v>7.31057181206924</c:v>
                 </c:pt>
                 <c:pt idx="8">
-                  <c:v>8.094331798825484</c:v>
+                  <c:v>8.094331798825483</c:v>
                 </c:pt>
                 <c:pt idx="9">
                   <c:v>8.877655981063893</c:v>
                 </c:pt>
                 <c:pt idx="10">
-                  <c:v>9.600123890458974</c:v>
+                  <c:v>9.600123890458972</c:v>
                 </c:pt>
                 <c:pt idx="11">
                   <c:v>10.33181333310083</c:v>
@@ -4518,7 +4518,7 @@
                   <c:v>16.3804588426376</c:v>
                 </c:pt>
                 <c:pt idx="21">
-                  <c:v>17.18907220346324</c:v>
+                  <c:v>17.18907220346323</c:v>
                 </c:pt>
                 <c:pt idx="22">
                   <c:v>17.91908058899874</c:v>
@@ -4533,10 +4533,10 @@
                   <c:v>20.14353201566894</c:v>
                 </c:pt>
                 <c:pt idx="26">
-                  <c:v>20.92974527668899</c:v>
+                  <c:v>20.92974527668898</c:v>
                 </c:pt>
                 <c:pt idx="27">
-                  <c:v>21.44294291997554</c:v>
+                  <c:v>21.44294291997553</c:v>
                 </c:pt>
                 <c:pt idx="28">
                   <c:v>21.96996504073389</c:v>
@@ -4563,10 +4563,10 @@
                   <c:v>25.16454010464465</c:v>
                 </c:pt>
                 <c:pt idx="36">
-                  <c:v>50.17635289040877</c:v>
+                  <c:v>50.17635289040878</c:v>
                 </c:pt>
                 <c:pt idx="37">
-                  <c:v>73.80895931035484</c:v>
+                  <c:v>73.80895931035482</c:v>
                 </c:pt>
                 <c:pt idx="38">
                   <c:v>97.7774047008045</c:v>
@@ -4593,7 +4593,7 @@
                   <c:v>247.8038646005559</c:v>
                 </c:pt>
                 <c:pt idx="46">
-                  <c:v>266.54616974263</c:v>
+                  <c:v>266.5461697426299</c:v>
                 </c:pt>
                 <c:pt idx="47">
                   <c:v>288.9039213736116</c:v>
@@ -4908,7 +4908,7 @@
                   <c:v>6.378894674632424</c:v>
                 </c:pt>
                 <c:pt idx="7">
-                  <c:v>7.162525811725473</c:v>
+                  <c:v>7.16252581172547</c:v>
                 </c:pt>
                 <c:pt idx="8">
                   <c:v>7.958394950412978</c:v>
@@ -4947,7 +4947,7 @@
                   <c:v>15.49459796180133</c:v>
                 </c:pt>
                 <c:pt idx="20">
-                  <c:v>16.26541428942822</c:v>
+                  <c:v>16.26541428942821</c:v>
                 </c:pt>
                 <c:pt idx="21">
                   <c:v>17.03827563188969</c:v>
@@ -4980,7 +4980,7 @@
                   <c:v>23.34446787261166</c:v>
                 </c:pt>
                 <c:pt idx="31">
-                  <c:v>23.99256346213333</c:v>
+                  <c:v>23.99256346213332</c:v>
                 </c:pt>
                 <c:pt idx="32">
                   <c:v>24.00221474812025</c:v>
@@ -5025,7 +5025,7 @@
                   <c:v>274.4960031777379</c:v>
                 </c:pt>
                 <c:pt idx="46">
-                  <c:v>298.5766378621991</c:v>
+                  <c:v>298.576637862199</c:v>
                 </c:pt>
                 <c:pt idx="47">
                   <c:v>322.7684256878879</c:v>
@@ -5317,13 +5317,13 @@
                   <c:v>3.819081983984732</c:v>
                 </c:pt>
                 <c:pt idx="5">
-                  <c:v>5.471130189920876</c:v>
+                  <c:v>5.471130189920877</c:v>
                 </c:pt>
                 <c:pt idx="6">
                   <c:v>6.28873279135187</c:v>
                 </c:pt>
                 <c:pt idx="7">
-                  <c:v>7.05655022925881</c:v>
+                  <c:v>7.056550229258809</c:v>
                 </c:pt>
                 <c:pt idx="8">
                   <c:v>7.799613921190096</c:v>
@@ -5410,7 +5410,7 @@
                   <c:v>26.43756719208052</c:v>
                 </c:pt>
                 <c:pt idx="36">
-                  <c:v>49.7847505993631</c:v>
+                  <c:v>49.78475059936309</c:v>
                 </c:pt>
                 <c:pt idx="37">
                   <c:v>77.9294277614337</c:v>
@@ -5440,13 +5440,13 @@
                   <c:v>278.922790481465</c:v>
                 </c:pt>
                 <c:pt idx="46">
-                  <c:v>303.7782662066713</c:v>
+                  <c:v>303.7782662066712</c:v>
                 </c:pt>
                 <c:pt idx="47">
                   <c:v>328.6797765025556</c:v>
                 </c:pt>
                 <c:pt idx="48">
-                  <c:v>353.2466585520223</c:v>
+                  <c:v>353.2466585520222</c:v>
                 </c:pt>
                 <c:pt idx="49">
                   <c:v>377.2594189069492</c:v>
@@ -5464,11 +5464,11 @@
           <c:showPercent val="0"/>
           <c:showBubbleSize val="0"/>
         </c:dLbls>
-        <c:axId val="-951692768"/>
-        <c:axId val="-951688864"/>
+        <c:axId val="-951424256"/>
+        <c:axId val="-951412352"/>
       </c:scatterChart>
       <c:valAx>
-        <c:axId val="-951692768"/>
+        <c:axId val="-951424256"/>
         <c:scaling>
           <c:orientation val="minMax"/>
           <c:max val="540.0"/>
@@ -5577,12 +5577,12 @@
             <a:endParaRPr lang="en-US"/>
           </a:p>
         </c:txPr>
-        <c:crossAx val="-951688864"/>
+        <c:crossAx val="-951412352"/>
         <c:crosses val="autoZero"/>
         <c:crossBetween val="midCat"/>
       </c:valAx>
       <c:valAx>
-        <c:axId val="-951688864"/>
+        <c:axId val="-951412352"/>
         <c:scaling>
           <c:orientation val="minMax"/>
         </c:scaling>
@@ -5689,7 +5689,7 @@
             <a:endParaRPr lang="en-US"/>
           </a:p>
         </c:txPr>
-        <c:crossAx val="-951692768"/>
+        <c:crossAx val="-951424256"/>
         <c:crosses val="autoZero"/>
         <c:crossBetween val="midCat"/>
       </c:valAx>
@@ -6075,13 +6075,13 @@
                   <c:v>3.819081983984732</c:v>
                 </c:pt>
                 <c:pt idx="5">
-                  <c:v>5.471130189920878</c:v>
+                  <c:v>5.47113018992088</c:v>
                 </c:pt>
                 <c:pt idx="6">
                   <c:v>6.28873279135187</c:v>
                 </c:pt>
                 <c:pt idx="7">
-                  <c:v>7.056550229258808</c:v>
+                  <c:v>7.056550229258807</c:v>
                 </c:pt>
                 <c:pt idx="8">
                   <c:v>7.799613921190096</c:v>
@@ -6222,11 +6222,11 @@
           <c:showPercent val="0"/>
           <c:showBubbleSize val="0"/>
         </c:dLbls>
-        <c:axId val="-948336336"/>
-        <c:axId val="-950964032"/>
+        <c:axId val="-1321980992"/>
+        <c:axId val="-1321977600"/>
       </c:scatterChart>
       <c:valAx>
-        <c:axId val="-948336336"/>
+        <c:axId val="-1321980992"/>
         <c:scaling>
           <c:orientation val="minMax"/>
           <c:max val="540.0"/>
@@ -6299,6 +6299,7 @@
             </a:p>
           </c:txPr>
         </c:title>
+        <c:numFmt formatCode="General" sourceLinked="0"/>
         <c:majorTickMark val="none"/>
         <c:minorTickMark val="none"/>
         <c:tickLblPos val="nextTo"/>
@@ -6335,12 +6336,12 @@
             <a:endParaRPr lang="en-US"/>
           </a:p>
         </c:txPr>
-        <c:crossAx val="-950964032"/>
+        <c:crossAx val="-1321977600"/>
         <c:crosses val="autoZero"/>
         <c:crossBetween val="midCat"/>
       </c:valAx>
       <c:valAx>
-        <c:axId val="-950964032"/>
+        <c:axId val="-1321977600"/>
         <c:scaling>
           <c:orientation val="minMax"/>
         </c:scaling>
@@ -6447,7 +6448,7 @@
             <a:endParaRPr lang="en-US"/>
           </a:p>
         </c:txPr>
-        <c:crossAx val="-948336336"/>
+        <c:crossAx val="-1321980992"/>
         <c:crosses val="autoZero"/>
         <c:crossBetween val="midCat"/>
       </c:valAx>
@@ -6904,11 +6905,11 @@
           <c:showPercent val="0"/>
           <c:showBubbleSize val="0"/>
         </c:dLbls>
-        <c:axId val="-949974448"/>
-        <c:axId val="-949970416"/>
+        <c:axId val="-951841120"/>
+        <c:axId val="-888804496"/>
       </c:scatterChart>
       <c:valAx>
-        <c:axId val="-949974448"/>
+        <c:axId val="-951841120"/>
         <c:scaling>
           <c:orientation val="minMax"/>
           <c:max val="540.0"/>
@@ -7023,12 +7024,12 @@
             <a:endParaRPr lang="en-US"/>
           </a:p>
         </c:txPr>
-        <c:crossAx val="-949970416"/>
+        <c:crossAx val="-888804496"/>
         <c:crosses val="autoZero"/>
         <c:crossBetween val="midCat"/>
       </c:valAx>
       <c:valAx>
-        <c:axId val="-949970416"/>
+        <c:axId val="-888804496"/>
         <c:scaling>
           <c:orientation val="minMax"/>
           <c:max val="2.0"/>
@@ -7136,7 +7137,7 @@
             <a:endParaRPr lang="en-US"/>
           </a:p>
         </c:txPr>
-        <c:crossAx val="-949974448"/>
+        <c:crossAx val="-951841120"/>
         <c:crosses val="autoZero"/>
         <c:crossBetween val="midCat"/>
       </c:valAx>
@@ -12189,12 +12190,12 @@
 <c:userShapes xmlns:c="http://schemas.openxmlformats.org/drawingml/2006/chart">
   <cdr:relSizeAnchor xmlns:cdr="http://schemas.openxmlformats.org/drawingml/2006/chartDrawing">
     <cdr:from>
-      <cdr:x>0.07354</cdr:x>
-      <cdr:y>0.92364</cdr:y>
+      <cdr:x>0.12224</cdr:x>
+      <cdr:y>0.83488</cdr:y>
     </cdr:from>
     <cdr:to>
-      <cdr:x>0.14854</cdr:x>
-      <cdr:y>0.97025</cdr:y>
+      <cdr:x>0.19724</cdr:x>
+      <cdr:y>0.88149</cdr:y>
     </cdr:to>
     <cdr:sp macro="" textlink="">
       <cdr:nvSpPr>
@@ -12203,8 +12204,8 @@
       </cdr:nvSpPr>
       <cdr:spPr>
         <a:xfrm xmlns:a="http://schemas.openxmlformats.org/drawingml/2006/main">
-          <a:off x="896587" y="5530241"/>
-          <a:ext cx="914400" cy="279070"/>
+          <a:off x="1490366" y="4998818"/>
+          <a:ext cx="914400" cy="279074"/>
         </a:xfrm>
         <a:prstGeom xmlns:a="http://schemas.openxmlformats.org/drawingml/2006/main" prst="rect">
           <a:avLst/>
@@ -12233,12 +12234,12 @@
   </cdr:relSizeAnchor>
   <cdr:relSizeAnchor xmlns:cdr="http://schemas.openxmlformats.org/drawingml/2006/chartDrawing">
     <cdr:from>
-      <cdr:x>0.9212</cdr:x>
-      <cdr:y>0.76937</cdr:y>
+      <cdr:x>0.89968</cdr:x>
+      <cdr:y>0.29039</cdr:y>
     </cdr:from>
     <cdr:to>
-      <cdr:x>0.9962</cdr:x>
-      <cdr:y>0.81598</cdr:y>
+      <cdr:x>0.97468</cdr:x>
+      <cdr:y>0.337</cdr:y>
     </cdr:to>
     <cdr:sp macro="" textlink="">
       <cdr:nvSpPr>
@@ -12247,8 +12248,8 @@
       </cdr:nvSpPr>
       <cdr:spPr>
         <a:xfrm xmlns:a="http://schemas.openxmlformats.org/drawingml/2006/main">
-          <a:off x="11231216" y="4606568"/>
-          <a:ext cx="914400" cy="279070"/>
+          <a:off x="10968841" y="1738677"/>
+          <a:ext cx="914400" cy="279075"/>
         </a:xfrm>
         <a:prstGeom xmlns:a="http://schemas.openxmlformats.org/drawingml/2006/main" prst="rect">
           <a:avLst/>
@@ -12434,7 +12435,7 @@
           <a:p>
             <a:fld id="{E5E12688-8E35-CA4B-B576-BA5244C40734}" type="datetimeFigureOut">
               <a:rPr lang="en-US" smtClean="0"/>
-              <a:t>5/23/17</a:t>
+              <a:t>5/24/17</a:t>
             </a:fld>
             <a:endParaRPr lang="en-US"/>
           </a:p>
@@ -13001,7 +13002,7 @@
           <a:p>
             <a:fld id="{3E16F4F7-D7BF-9146-8E12-4D8712091BAE}" type="datetimeFigureOut">
               <a:rPr lang="en-US" smtClean="0"/>
-              <a:t>5/23/17</a:t>
+              <a:t>5/24/17</a:t>
             </a:fld>
             <a:endParaRPr lang="en-US"/>
           </a:p>
@@ -13171,7 +13172,7 @@
           <a:p>
             <a:fld id="{3E16F4F7-D7BF-9146-8E12-4D8712091BAE}" type="datetimeFigureOut">
               <a:rPr lang="en-US" smtClean="0"/>
-              <a:t>5/23/17</a:t>
+              <a:t>5/24/17</a:t>
             </a:fld>
             <a:endParaRPr lang="en-US"/>
           </a:p>
@@ -13351,7 +13352,7 @@
           <a:p>
             <a:fld id="{3E16F4F7-D7BF-9146-8E12-4D8712091BAE}" type="datetimeFigureOut">
               <a:rPr lang="en-US" smtClean="0"/>
-              <a:t>5/23/17</a:t>
+              <a:t>5/24/17</a:t>
             </a:fld>
             <a:endParaRPr lang="en-US"/>
           </a:p>
@@ -13521,7 +13522,7 @@
           <a:p>
             <a:fld id="{3E16F4F7-D7BF-9146-8E12-4D8712091BAE}" type="datetimeFigureOut">
               <a:rPr lang="en-US" smtClean="0"/>
-              <a:t>5/23/17</a:t>
+              <a:t>5/24/17</a:t>
             </a:fld>
             <a:endParaRPr lang="en-US"/>
           </a:p>
@@ -13767,7 +13768,7 @@
           <a:p>
             <a:fld id="{3E16F4F7-D7BF-9146-8E12-4D8712091BAE}" type="datetimeFigureOut">
               <a:rPr lang="en-US" smtClean="0"/>
-              <a:t>5/23/17</a:t>
+              <a:t>5/24/17</a:t>
             </a:fld>
             <a:endParaRPr lang="en-US"/>
           </a:p>
@@ -13999,7 +14000,7 @@
           <a:p>
             <a:fld id="{3E16F4F7-D7BF-9146-8E12-4D8712091BAE}" type="datetimeFigureOut">
               <a:rPr lang="en-US" smtClean="0"/>
-              <a:t>5/23/17</a:t>
+              <a:t>5/24/17</a:t>
             </a:fld>
             <a:endParaRPr lang="en-US"/>
           </a:p>
@@ -14366,7 +14367,7 @@
           <a:p>
             <a:fld id="{3E16F4F7-D7BF-9146-8E12-4D8712091BAE}" type="datetimeFigureOut">
               <a:rPr lang="en-US" smtClean="0"/>
-              <a:t>5/23/17</a:t>
+              <a:t>5/24/17</a:t>
             </a:fld>
             <a:endParaRPr lang="en-US"/>
           </a:p>
@@ -14484,7 +14485,7 @@
           <a:p>
             <a:fld id="{3E16F4F7-D7BF-9146-8E12-4D8712091BAE}" type="datetimeFigureOut">
               <a:rPr lang="en-US" smtClean="0"/>
-              <a:t>5/23/17</a:t>
+              <a:t>5/24/17</a:t>
             </a:fld>
             <a:endParaRPr lang="en-US"/>
           </a:p>
@@ -14579,7 +14580,7 @@
           <a:p>
             <a:fld id="{3E16F4F7-D7BF-9146-8E12-4D8712091BAE}" type="datetimeFigureOut">
               <a:rPr lang="en-US" smtClean="0"/>
-              <a:t>5/23/17</a:t>
+              <a:t>5/24/17</a:t>
             </a:fld>
             <a:endParaRPr lang="en-US"/>
           </a:p>
@@ -14856,7 +14857,7 @@
           <a:p>
             <a:fld id="{3E16F4F7-D7BF-9146-8E12-4D8712091BAE}" type="datetimeFigureOut">
               <a:rPr lang="en-US" smtClean="0"/>
-              <a:t>5/23/17</a:t>
+              <a:t>5/24/17</a:t>
             </a:fld>
             <a:endParaRPr lang="en-US"/>
           </a:p>
@@ -15113,7 +15114,7 @@
           <a:p>
             <a:fld id="{3E16F4F7-D7BF-9146-8E12-4D8712091BAE}" type="datetimeFigureOut">
               <a:rPr lang="en-US" smtClean="0"/>
-              <a:t>5/23/17</a:t>
+              <a:t>5/24/17</a:t>
             </a:fld>
             <a:endParaRPr lang="en-US"/>
           </a:p>
@@ -15326,7 +15327,7 @@
           <a:p>
             <a:fld id="{3E16F4F7-D7BF-9146-8E12-4D8712091BAE}" type="datetimeFigureOut">
               <a:rPr lang="en-US" smtClean="0"/>
-              <a:t>5/23/17</a:t>
+              <a:t>5/24/17</a:t>
             </a:fld>
             <a:endParaRPr lang="en-US"/>
           </a:p>
@@ -20700,13 +20701,9 @@
           <a:p>
             <a:r>
               <a:rPr lang="en-US" dirty="0" smtClean="0"/>
-              <a:t>Mean </a:t>
+              <a:t>Mean Model Length = 330</a:t>
             </a:r>
-            <a:r>
-              <a:rPr lang="en-US" smtClean="0"/>
-              <a:t>Model Length = 330</a:t>
-            </a:r>
-            <a:endParaRPr lang="en-US"/>
+            <a:endParaRPr lang="en-US" dirty="0"/>
           </a:p>
         </p:txBody>
       </p:sp>
@@ -20905,6 +20902,33 @@
                                   </p:childTnLst>
                                 </p:cTn>
                               </p:par>
+                              <p:par>
+                                <p:cTn id="15" presetID="1" presetClass="entr" presetSubtype="0" fill="hold" grpId="0" nodeType="withEffect">
+                                  <p:stCondLst>
+                                    <p:cond delay="0"/>
+                                  </p:stCondLst>
+                                  <p:childTnLst>
+                                    <p:set>
+                                      <p:cBhvr>
+                                        <p:cTn id="16" dur="1" fill="hold">
+                                          <p:stCondLst>
+                                            <p:cond delay="0"/>
+                                          </p:stCondLst>
+                                        </p:cTn>
+                                        <p:tgtEl>
+                                          <p:spTgt spid="22"/>
+                                        </p:tgtEl>
+                                        <p:attrNameLst>
+                                          <p:attrName>style.visibility</p:attrName>
+                                        </p:attrNameLst>
+                                      </p:cBhvr>
+                                      <p:to>
+                                        <p:strVal val="visible"/>
+                                      </p:to>
+                                    </p:set>
+                                  </p:childTnLst>
+                                </p:cTn>
+                              </p:par>
                             </p:childTnLst>
                           </p:cTn>
                         </p:par>
@@ -20938,6 +20962,7 @@
       <p:bldP spid="18" grpId="0"/>
       <p:bldP spid="19" grpId="0"/>
       <p:bldP spid="20" grpId="0"/>
+      <p:bldP spid="22" grpId="0"/>
     </p:bldLst>
   </p:timing>
 </p:sld>
@@ -21169,7 +21194,7 @@
         <p:spPr>
           <a:xfrm>
             <a:off x="1508166" y="1032555"/>
-            <a:ext cx="652743" cy="369332"/>
+            <a:ext cx="710451" cy="369332"/>
           </a:xfrm>
           <a:prstGeom prst="rect">
             <a:avLst/>
@@ -21183,10 +21208,10 @@
           <a:lstStyle/>
           <a:p>
             <a:r>
-              <a:rPr lang="en-US" smtClean="0"/>
-              <a:t>5141</a:t>
+              <a:rPr lang="en-US" dirty="0" smtClean="0"/>
+              <a:t>5,141</a:t>
             </a:r>
-            <a:endParaRPr lang="en-US"/>
+            <a:endParaRPr lang="en-US" dirty="0"/>
           </a:p>
         </p:txBody>
       </p:sp>
@@ -21275,6 +21300,66 @@
             <a:r>
               <a:rPr lang="en-US" smtClean="0"/>
               <a:t>106,607</a:t>
+            </a:r>
+            <a:endParaRPr lang="en-US"/>
+          </a:p>
+        </p:txBody>
+      </p:sp>
+      <p:sp>
+        <p:nvSpPr>
+          <p:cNvPr id="3" name="TextBox 2"/>
+          <p:cNvSpPr txBox="1"/>
+          <p:nvPr/>
+        </p:nvSpPr>
+        <p:spPr>
+          <a:xfrm>
+            <a:off x="5567760" y="1027216"/>
+            <a:ext cx="710451" cy="369332"/>
+          </a:xfrm>
+          <a:prstGeom prst="rect">
+            <a:avLst/>
+          </a:prstGeom>
+          <a:noFill/>
+        </p:spPr>
+        <p:txBody>
+          <a:bodyPr wrap="none" rtlCol="0">
+            <a:spAutoFit/>
+          </a:bodyPr>
+          <a:lstStyle/>
+          <a:p>
+            <a:r>
+              <a:rPr lang="en-US" smtClean="0"/>
+              <a:t>6,681</a:t>
+            </a:r>
+            <a:endParaRPr lang="en-US"/>
+          </a:p>
+        </p:txBody>
+      </p:sp>
+      <p:sp>
+        <p:nvSpPr>
+          <p:cNvPr id="4" name="TextBox 3"/>
+          <p:cNvSpPr txBox="1"/>
+          <p:nvPr/>
+        </p:nvSpPr>
+        <p:spPr>
+          <a:xfrm>
+            <a:off x="10881555" y="1037894"/>
+            <a:ext cx="944489" cy="369332"/>
+          </a:xfrm>
+          <a:prstGeom prst="rect">
+            <a:avLst/>
+          </a:prstGeom>
+          <a:noFill/>
+        </p:spPr>
+        <p:txBody>
+          <a:bodyPr wrap="none" rtlCol="0">
+            <a:spAutoFit/>
+          </a:bodyPr>
+          <a:lstStyle/>
+          <a:p>
+            <a:r>
+              <a:rPr lang="en-US" smtClean="0"/>
+              <a:t>821,893</a:t>
             </a:r>
             <a:endParaRPr lang="en-US"/>
           </a:p>
@@ -21443,7 +21528,7 @@
           <p:nvPr>
             <p:extLst>
               <p:ext uri="{D42A27DB-BD31-4B8C-83A1-F6EECF244321}">
-                <p14:modId xmlns:p14="http://schemas.microsoft.com/office/powerpoint/2010/main" val="2045677395"/>
+                <p14:modId xmlns:p14="http://schemas.microsoft.com/office/powerpoint/2010/main" val="269651837"/>
               </p:ext>
             </p:extLst>
           </p:nvPr>
@@ -21503,7 +21588,7 @@
         </p:nvCxnSpPr>
         <p:spPr>
           <a:xfrm flipH="1">
-            <a:off x="1396340" y="6008914"/>
+            <a:off x="1493322" y="2891641"/>
             <a:ext cx="10526486" cy="0"/>
           </a:xfrm>
           <a:prstGeom prst="straightConnector1">
@@ -21570,7 +21655,7 @@
         </p:nvSpPr>
         <p:spPr>
           <a:xfrm>
-            <a:off x="6276731" y="5296395"/>
+            <a:off x="5267328" y="2239904"/>
             <a:ext cx="1537600" cy="369332"/>
           </a:xfrm>
           <a:prstGeom prst="rect">
@@ -21592,42 +21677,6 @@
           </a:p>
         </p:txBody>
       </p:sp>
-      <p:cxnSp>
-        <p:nvCxnSpPr>
-          <p:cNvPr id="13" name="Straight Connector 12"/>
-          <p:cNvCxnSpPr/>
-          <p:nvPr/>
-        </p:nvCxnSpPr>
-        <p:spPr>
-          <a:xfrm>
-            <a:off x="1396340" y="6008914"/>
-            <a:ext cx="0" cy="492826"/>
-          </a:xfrm>
-          <a:prstGeom prst="line">
-            <a:avLst/>
-          </a:prstGeom>
-          <a:ln w="12700" cmpd="sng">
-            <a:solidFill>
-              <a:schemeClr val="tx1"/>
-            </a:solidFill>
-            <a:prstDash val="dash"/>
-          </a:ln>
-        </p:spPr>
-        <p:style>
-          <a:lnRef idx="1">
-            <a:schemeClr val="accent1"/>
-          </a:lnRef>
-          <a:fillRef idx="0">
-            <a:schemeClr val="accent1"/>
-          </a:fillRef>
-          <a:effectRef idx="0">
-            <a:schemeClr val="accent1"/>
-          </a:effectRef>
-          <a:fontRef idx="minor">
-            <a:schemeClr val="tx1"/>
-          </a:fontRef>
-        </p:style>
-      </p:cxnSp>
     </p:spTree>
     <p:extLst>
       <p:ext uri="{BB962C8B-B14F-4D97-AF65-F5344CB8AC3E}">
@@ -23434,15 +23483,13 @@
           <a:p>
             <a:r>
               <a:rPr lang="en-US" dirty="0" smtClean="0"/>
-              <a:t>Combination of better parallel scaling + new instructions almost doubles HMMER 4 performance relative to HMMER 3</a:t>
+              <a:t>Combination of better parallel scaling + new instructions almost doubles HMMER 4 performance relative to HMMER </a:t>
             </a:r>
-          </a:p>
-          <a:p>
-            <a:pPr lvl="1"/>
             <a:r>
               <a:rPr lang="en-US" dirty="0" smtClean="0"/>
-              <a:t>In spite of changes to main stage that sometimes add time</a:t>
+              <a:t>3</a:t>
             </a:r>
+            <a:endParaRPr lang="en-US" dirty="0" smtClean="0"/>
           </a:p>
           <a:p>
             <a:r>
@@ -23696,13 +23743,8 @@
             <a:pPr algn="ctr"/>
             <a:r>
               <a:rPr lang="en-US" dirty="0" smtClean="0"/>
-              <a:t>Bi</a:t>
+              <a:t>Bias</a:t>
             </a:r>
-            <a:r>
-              <a:rPr lang="en-US" dirty="0" smtClean="0"/>
-              <a:t>as</a:t>
-            </a:r>
-            <a:endParaRPr lang="en-US" dirty="0" smtClean="0"/>
           </a:p>
           <a:p>
             <a:pPr algn="ctr"/>
@@ -28887,7 +28929,11 @@
           <a:p>
             <a:r>
               <a:rPr lang="en-US" dirty="0" smtClean="0"/>
-              <a:t>Within-Node Load Balancing	</a:t>
+              <a:t>Within-Computer </a:t>
+            </a:r>
+            <a:r>
+              <a:rPr lang="en-US" dirty="0" smtClean="0"/>
+              <a:t>Load Balancing	</a:t>
             </a:r>
             <a:endParaRPr lang="en-US" dirty="0"/>
           </a:p>
@@ -29026,7 +29072,7 @@
         <p:spPr>
           <a:xfrm>
             <a:off x="165100" y="666750"/>
-            <a:ext cx="769763" cy="369332"/>
+            <a:ext cx="827471" cy="369332"/>
           </a:xfrm>
           <a:prstGeom prst="rect">
             <a:avLst/>
@@ -29041,7 +29087,7 @@
           <a:p>
             <a:r>
               <a:rPr lang="en-US" smtClean="0"/>
-              <a:t>17948</a:t>
+              <a:t>17,948</a:t>
             </a:r>
             <a:endParaRPr lang="en-US"/>
           </a:p>
@@ -29057,8 +29103,8 @@
         </p:nvCxnSpPr>
         <p:spPr>
           <a:xfrm>
-            <a:off x="549982" y="1036082"/>
-            <a:ext cx="466018" cy="240268"/>
+            <a:off x="578836" y="1036082"/>
+            <a:ext cx="437164" cy="240268"/>
           </a:xfrm>
           <a:prstGeom prst="straightConnector1">
             <a:avLst/>

</xml_diff>